<commit_message>
:minibus: mise à jour du slide sur React.JS
</commit_message>
<xml_diff>
--- a/10_introduction-react-js_Stan-Chollet.pptx
+++ b/10_introduction-react-js_Stan-Chollet.pptx
@@ -15,8 +15,8 @@
     <p:sldId id="296" r:id="rId9"/>
     <p:sldId id="270" r:id="rId10"/>
     <p:sldId id="297" r:id="rId11"/>
-    <p:sldId id="300" r:id="rId12"/>
-    <p:sldId id="298" r:id="rId13"/>
+    <p:sldId id="298" r:id="rId12"/>
+    <p:sldId id="300" r:id="rId13"/>
     <p:sldId id="299" r:id="rId14"/>
     <p:sldId id="301" r:id="rId15"/>
     <p:sldId id="302" r:id="rId16"/>
@@ -264,7 +264,7 @@
           <a:p>
             <a:fld id="{3D06E3AD-E22D-7B49-A93F-0C611B02B1F3}" type="datetimeFigureOut">
               <a:rPr lang="en-US" smtClean="0"/>
-              <a:t>2/18/16</a:t>
+              <a:t>2/23/16</a:t>
             </a:fld>
             <a:endParaRPr lang="en-US"/>
           </a:p>
@@ -441,7 +441,7 @@
           <a:p>
             <a:fld id="{3D06E3AD-E22D-7B49-A93F-0C611B02B1F3}" type="datetimeFigureOut">
               <a:rPr lang="en-US" smtClean="0"/>
-              <a:t>2/18/16</a:t>
+              <a:t>2/23/16</a:t>
             </a:fld>
             <a:endParaRPr lang="en-US"/>
           </a:p>
@@ -621,7 +621,7 @@
           <a:p>
             <a:fld id="{3D06E3AD-E22D-7B49-A93F-0C611B02B1F3}" type="datetimeFigureOut">
               <a:rPr lang="en-US" smtClean="0"/>
-              <a:t>2/18/16</a:t>
+              <a:t>2/23/16</a:t>
             </a:fld>
             <a:endParaRPr lang="en-US"/>
           </a:p>
@@ -815,7 +815,7 @@
           <a:p>
             <a:fld id="{3D06E3AD-E22D-7B49-A93F-0C611B02B1F3}" type="datetimeFigureOut">
               <a:rPr lang="en-US" smtClean="0"/>
-              <a:t>2/18/16</a:t>
+              <a:t>2/23/16</a:t>
             </a:fld>
             <a:endParaRPr lang="en-US"/>
           </a:p>
@@ -1068,7 +1068,7 @@
           <a:p>
             <a:fld id="{3D06E3AD-E22D-7B49-A93F-0C611B02B1F3}" type="datetimeFigureOut">
               <a:rPr lang="en-US" smtClean="0"/>
-              <a:t>2/18/16</a:t>
+              <a:t>2/23/16</a:t>
             </a:fld>
             <a:endParaRPr lang="en-US"/>
           </a:p>
@@ -1300,7 +1300,7 @@
           <a:p>
             <a:fld id="{3D06E3AD-E22D-7B49-A93F-0C611B02B1F3}" type="datetimeFigureOut">
               <a:rPr lang="en-US" smtClean="0"/>
-              <a:t>2/18/16</a:t>
+              <a:t>2/23/16</a:t>
             </a:fld>
             <a:endParaRPr lang="en-US"/>
           </a:p>
@@ -1667,7 +1667,7 @@
           <a:p>
             <a:fld id="{3D06E3AD-E22D-7B49-A93F-0C611B02B1F3}" type="datetimeFigureOut">
               <a:rPr lang="en-US" smtClean="0"/>
-              <a:t>2/18/16</a:t>
+              <a:t>2/23/16</a:t>
             </a:fld>
             <a:endParaRPr lang="en-US"/>
           </a:p>
@@ -1792,7 +1792,7 @@
           <a:p>
             <a:fld id="{3D06E3AD-E22D-7B49-A93F-0C611B02B1F3}" type="datetimeFigureOut">
               <a:rPr lang="en-US" smtClean="0"/>
-              <a:t>2/18/16</a:t>
+              <a:t>2/23/16</a:t>
             </a:fld>
             <a:endParaRPr lang="en-US"/>
           </a:p>
@@ -1894,7 +1894,7 @@
           <a:p>
             <a:fld id="{3D06E3AD-E22D-7B49-A93F-0C611B02B1F3}" type="datetimeFigureOut">
               <a:rPr lang="en-US" smtClean="0"/>
-              <a:t>2/18/16</a:t>
+              <a:t>2/23/16</a:t>
             </a:fld>
             <a:endParaRPr lang="en-US"/>
           </a:p>
@@ -2171,7 +2171,7 @@
           <a:p>
             <a:fld id="{3D06E3AD-E22D-7B49-A93F-0C611B02B1F3}" type="datetimeFigureOut">
               <a:rPr lang="en-US" smtClean="0"/>
-              <a:t>2/18/16</a:t>
+              <a:t>2/23/16</a:t>
             </a:fld>
             <a:endParaRPr lang="en-US"/>
           </a:p>
@@ -2424,7 +2424,7 @@
           <a:p>
             <a:fld id="{3D06E3AD-E22D-7B49-A93F-0C611B02B1F3}" type="datetimeFigureOut">
               <a:rPr lang="en-US" smtClean="0"/>
-              <a:t>2/18/16</a:t>
+              <a:t>2/23/16</a:t>
             </a:fld>
             <a:endParaRPr lang="en-US"/>
           </a:p>
@@ -2656,7 +2656,7 @@
           <a:p>
             <a:fld id="{3D06E3AD-E22D-7B49-A93F-0C611B02B1F3}" type="datetimeFigureOut">
               <a:rPr lang="en-US" smtClean="0"/>
-              <a:t>2/18/16</a:t>
+              <a:t>2/23/16</a:t>
             </a:fld>
             <a:endParaRPr lang="en-US"/>
           </a:p>
@@ -3091,12 +3091,12 @@
           <a:lstStyle/>
           <a:p>
             <a:r>
-              <a:rPr lang="en-US" sz="8800" dirty="0" smtClean="0">
+              <a:rPr lang="en-US" sz="8800" dirty="0" err="1" smtClean="0">
                 <a:latin typeface="Roboto" charset="0"/>
                 <a:ea typeface="Roboto" charset="0"/>
                 <a:cs typeface="Roboto" charset="0"/>
               </a:rPr>
-              <a:t>React Native</a:t>
+              <a:t>React.js</a:t>
             </a:r>
             <a:endParaRPr lang="en-US" sz="8800" dirty="0">
               <a:latin typeface="Roboto" charset="0"/>
@@ -3913,6 +3913,114 @@
                 <a:ea typeface="Open Sans" charset="0"/>
                 <a:cs typeface="Open Sans" charset="0"/>
               </a:rPr>
+              <a:t>Virtual DOM</a:t>
+            </a:r>
+            <a:endParaRPr lang="en-US" sz="3200" b="1" dirty="0">
+              <a:latin typeface="Open Sans" charset="0"/>
+              <a:ea typeface="Open Sans" charset="0"/>
+              <a:cs typeface="Open Sans" charset="0"/>
+            </a:endParaRPr>
+          </a:p>
+        </p:txBody>
+      </p:sp>
+      <p:pic>
+        <p:nvPicPr>
+          <p:cNvPr id="5" name="Picture 4"/>
+          <p:cNvPicPr>
+            <a:picLocks noChangeAspect="1"/>
+          </p:cNvPicPr>
+          <p:nvPr/>
+        </p:nvPicPr>
+        <p:blipFill rotWithShape="1">
+          <a:blip r:embed="rId2">
+            <a:extLst>
+              <a:ext uri="{28A0092B-C50C-407E-A947-70E740481C1C}">
+                <a14:useLocalDpi xmlns:a14="http://schemas.microsoft.com/office/drawing/2010/main" val="0"/>
+              </a:ext>
+            </a:extLst>
+          </a:blip>
+          <a:srcRect t="30719"/>
+          <a:stretch/>
+        </p:blipFill>
+        <p:spPr>
+          <a:xfrm>
+            <a:off x="2952958" y="2318196"/>
+            <a:ext cx="6235700" cy="3343499"/>
+          </a:xfrm>
+          <a:prstGeom prst="rect">
+            <a:avLst/>
+          </a:prstGeom>
+        </p:spPr>
+      </p:pic>
+    </p:spTree>
+    <p:extLst>
+      <p:ext uri="{BB962C8B-B14F-4D97-AF65-F5344CB8AC3E}">
+        <p14:creationId xmlns:p14="http://schemas.microsoft.com/office/powerpoint/2010/main" val="1570030877"/>
+      </p:ext>
+    </p:extLst>
+  </p:cSld>
+  <p:clrMapOvr>
+    <a:masterClrMapping/>
+  </p:clrMapOvr>
+  <p:timing>
+    <p:tnLst>
+      <p:par>
+        <p:cTn id="1" dur="indefinite" restart="never" nodeType="tmRoot"/>
+      </p:par>
+    </p:tnLst>
+  </p:timing>
+</p:sld>
+</file>
+
+<file path=ppt/slides/slide12.xml><?xml version="1.0" encoding="utf-8"?>
+<p:sld xmlns:a="http://schemas.openxmlformats.org/drawingml/2006/main" xmlns:r="http://schemas.openxmlformats.org/officeDocument/2006/relationships" xmlns:p="http://schemas.openxmlformats.org/presentationml/2006/main">
+  <p:cSld>
+    <p:spTree>
+      <p:nvGrpSpPr>
+        <p:cNvPr id="1" name=""/>
+        <p:cNvGrpSpPr/>
+        <p:nvPr/>
+      </p:nvGrpSpPr>
+      <p:grpSpPr>
+        <a:xfrm>
+          <a:off x="0" y="0"/>
+          <a:ext cx="0" cy="0"/>
+          <a:chOff x="0" y="0"/>
+          <a:chExt cx="0" cy="0"/>
+        </a:xfrm>
+      </p:grpSpPr>
+      <p:sp>
+        <p:nvSpPr>
+          <p:cNvPr id="4" name="Title 3"/>
+          <p:cNvSpPr>
+            <a:spLocks noGrp="1"/>
+          </p:cNvSpPr>
+          <p:nvPr>
+            <p:ph type="title"/>
+          </p:nvPr>
+        </p:nvSpPr>
+        <p:spPr>
+          <a:xfrm>
+            <a:off x="1044452" y="275169"/>
+            <a:ext cx="10052713" cy="1600152"/>
+          </a:xfrm>
+        </p:spPr>
+        <p:txBody>
+          <a:bodyPr>
+            <a:normAutofit/>
+          </a:bodyPr>
+          <a:lstStyle/>
+          <a:p>
+            <a:pPr algn="ctr"/>
+            <a:r>
+              <a:rPr lang="en-US" b="1" dirty="0" smtClean="0">
+                <a:solidFill>
+                  <a:srgbClr val="61DAFC"/>
+                </a:solidFill>
+                <a:latin typeface="Open Sans" charset="0"/>
+                <a:ea typeface="Open Sans" charset="0"/>
+                <a:cs typeface="Open Sans" charset="0"/>
+              </a:rPr>
               <a:t>Imbrication de </a:t>
             </a:r>
             <a:r>
@@ -4033,114 +4141,6 @@
     <p:extLst>
       <p:ext uri="{BB962C8B-B14F-4D97-AF65-F5344CB8AC3E}">
         <p14:creationId xmlns:p14="http://schemas.microsoft.com/office/powerpoint/2010/main" val="1526234166"/>
-      </p:ext>
-    </p:extLst>
-  </p:cSld>
-  <p:clrMapOvr>
-    <a:masterClrMapping/>
-  </p:clrMapOvr>
-  <p:timing>
-    <p:tnLst>
-      <p:par>
-        <p:cTn id="1" dur="indefinite" restart="never" nodeType="tmRoot"/>
-      </p:par>
-    </p:tnLst>
-  </p:timing>
-</p:sld>
-</file>
-
-<file path=ppt/slides/slide12.xml><?xml version="1.0" encoding="utf-8"?>
-<p:sld xmlns:a="http://schemas.openxmlformats.org/drawingml/2006/main" xmlns:r="http://schemas.openxmlformats.org/officeDocument/2006/relationships" xmlns:p="http://schemas.openxmlformats.org/presentationml/2006/main">
-  <p:cSld>
-    <p:spTree>
-      <p:nvGrpSpPr>
-        <p:cNvPr id="1" name=""/>
-        <p:cNvGrpSpPr/>
-        <p:nvPr/>
-      </p:nvGrpSpPr>
-      <p:grpSpPr>
-        <a:xfrm>
-          <a:off x="0" y="0"/>
-          <a:ext cx="0" cy="0"/>
-          <a:chOff x="0" y="0"/>
-          <a:chExt cx="0" cy="0"/>
-        </a:xfrm>
-      </p:grpSpPr>
-      <p:sp>
-        <p:nvSpPr>
-          <p:cNvPr id="4" name="Title 3"/>
-          <p:cNvSpPr>
-            <a:spLocks noGrp="1"/>
-          </p:cNvSpPr>
-          <p:nvPr>
-            <p:ph type="title"/>
-          </p:nvPr>
-        </p:nvSpPr>
-        <p:spPr>
-          <a:xfrm>
-            <a:off x="1044452" y="275169"/>
-            <a:ext cx="10052713" cy="1600152"/>
-          </a:xfrm>
-        </p:spPr>
-        <p:txBody>
-          <a:bodyPr>
-            <a:normAutofit/>
-          </a:bodyPr>
-          <a:lstStyle/>
-          <a:p>
-            <a:pPr algn="ctr"/>
-            <a:r>
-              <a:rPr lang="en-US" b="1" dirty="0" smtClean="0">
-                <a:solidFill>
-                  <a:srgbClr val="61DAFC"/>
-                </a:solidFill>
-                <a:latin typeface="Open Sans" charset="0"/>
-                <a:ea typeface="Open Sans" charset="0"/>
-                <a:cs typeface="Open Sans" charset="0"/>
-              </a:rPr>
-              <a:t>Virtual DOM</a:t>
-            </a:r>
-            <a:endParaRPr lang="en-US" sz="3200" b="1" dirty="0">
-              <a:latin typeface="Open Sans" charset="0"/>
-              <a:ea typeface="Open Sans" charset="0"/>
-              <a:cs typeface="Open Sans" charset="0"/>
-            </a:endParaRPr>
-          </a:p>
-        </p:txBody>
-      </p:sp>
-      <p:pic>
-        <p:nvPicPr>
-          <p:cNvPr id="5" name="Picture 4"/>
-          <p:cNvPicPr>
-            <a:picLocks noChangeAspect="1"/>
-          </p:cNvPicPr>
-          <p:nvPr/>
-        </p:nvPicPr>
-        <p:blipFill rotWithShape="1">
-          <a:blip r:embed="rId2">
-            <a:extLst>
-              <a:ext uri="{28A0092B-C50C-407E-A947-70E740481C1C}">
-                <a14:useLocalDpi xmlns:a14="http://schemas.microsoft.com/office/drawing/2010/main" val="0"/>
-              </a:ext>
-            </a:extLst>
-          </a:blip>
-          <a:srcRect t="30719"/>
-          <a:stretch/>
-        </p:blipFill>
-        <p:spPr>
-          <a:xfrm>
-            <a:off x="2952958" y="2318196"/>
-            <a:ext cx="6235700" cy="3343499"/>
-          </a:xfrm>
-          <a:prstGeom prst="rect">
-            <a:avLst/>
-          </a:prstGeom>
-        </p:spPr>
-      </p:pic>
-    </p:spTree>
-    <p:extLst>
-      <p:ext uri="{BB962C8B-B14F-4D97-AF65-F5344CB8AC3E}">
-        <p14:creationId xmlns:p14="http://schemas.microsoft.com/office/powerpoint/2010/main" val="1570030877"/>
       </p:ext>
     </p:extLst>
   </p:cSld>
@@ -4563,7 +4563,15 @@
                 <a:ea typeface="Open Sans" charset="0"/>
                 <a:cs typeface="Open Sans" charset="0"/>
               </a:rPr>
-              <a:t> par </a:t>
+              <a:t> par les parents </a:t>
+            </a:r>
+            <a:r>
+              <a:rPr lang="en-US" sz="2800" dirty="0" err="1" smtClean="0">
+                <a:latin typeface="Open Sans" charset="0"/>
+                <a:ea typeface="Open Sans" charset="0"/>
+                <a:cs typeface="Open Sans" charset="0"/>
+              </a:rPr>
+              <a:t>sont</a:t>
             </a:r>
             <a:r>
               <a:rPr lang="en-US" sz="2800" dirty="0" smtClean="0">
@@ -4571,7 +4579,15 @@
                 <a:ea typeface="Open Sans" charset="0"/>
                 <a:cs typeface="Open Sans" charset="0"/>
               </a:rPr>
-              <a:t>les </a:t>
+              <a:t> </a:t>
+            </a:r>
+            <a:r>
+              <a:rPr lang="en-US" sz="2800" dirty="0" err="1" smtClean="0">
+                <a:latin typeface="Open Sans" charset="0"/>
+                <a:ea typeface="Open Sans" charset="0"/>
+                <a:cs typeface="Open Sans" charset="0"/>
+              </a:rPr>
+              <a:t>disponibles</a:t>
             </a:r>
             <a:r>
               <a:rPr lang="en-US" sz="2800" dirty="0" smtClean="0">
@@ -4579,7 +4595,7 @@
                 <a:ea typeface="Open Sans" charset="0"/>
                 <a:cs typeface="Open Sans" charset="0"/>
               </a:rPr>
-              <a:t>parents </a:t>
+              <a:t> </a:t>
             </a:r>
             <a:r>
               <a:rPr lang="en-US" sz="2800" dirty="0" err="1" smtClean="0">
@@ -4587,7 +4603,7 @@
                 <a:ea typeface="Open Sans" charset="0"/>
                 <a:cs typeface="Open Sans" charset="0"/>
               </a:rPr>
-              <a:t>sont</a:t>
+              <a:t>à</a:t>
             </a:r>
             <a:r>
               <a:rPr lang="en-US" sz="2800" dirty="0" smtClean="0">
@@ -4595,7 +4611,7 @@
                 <a:ea typeface="Open Sans" charset="0"/>
                 <a:cs typeface="Open Sans" charset="0"/>
               </a:rPr>
-              <a:t> </a:t>
+              <a:t> travers la </a:t>
             </a:r>
             <a:r>
               <a:rPr lang="en-US" sz="2800" dirty="0" err="1" smtClean="0">
@@ -4603,7 +4619,7 @@
                 <a:ea typeface="Open Sans" charset="0"/>
                 <a:cs typeface="Open Sans" charset="0"/>
               </a:rPr>
-              <a:t>disponibles</a:t>
+              <a:t>propriété</a:t>
             </a:r>
             <a:r>
               <a:rPr lang="en-US" sz="2800" dirty="0" smtClean="0">
@@ -4611,47 +4627,7 @@
                 <a:ea typeface="Open Sans" charset="0"/>
                 <a:cs typeface="Open Sans" charset="0"/>
               </a:rPr>
-              <a:t> </a:t>
-            </a:r>
-            <a:r>
-              <a:rPr lang="en-US" sz="2800" dirty="0" err="1" smtClean="0">
-                <a:latin typeface="Open Sans" charset="0"/>
-                <a:ea typeface="Open Sans" charset="0"/>
-                <a:cs typeface="Open Sans" charset="0"/>
-              </a:rPr>
-              <a:t>à</a:t>
-            </a:r>
-            <a:r>
-              <a:rPr lang="en-US" sz="2800" dirty="0" smtClean="0">
-                <a:latin typeface="Open Sans" charset="0"/>
-                <a:ea typeface="Open Sans" charset="0"/>
-                <a:cs typeface="Open Sans" charset="0"/>
-              </a:rPr>
-              <a:t> travers la </a:t>
-            </a:r>
-            <a:r>
-              <a:rPr lang="en-US" sz="2800" dirty="0" err="1" smtClean="0">
-                <a:latin typeface="Open Sans" charset="0"/>
-                <a:ea typeface="Open Sans" charset="0"/>
-                <a:cs typeface="Open Sans" charset="0"/>
-              </a:rPr>
-              <a:t>propriété</a:t>
-            </a:r>
-            <a:r>
-              <a:rPr lang="en-US" sz="2800" dirty="0" smtClean="0">
-                <a:latin typeface="Open Sans" charset="0"/>
-                <a:ea typeface="Open Sans" charset="0"/>
-                <a:cs typeface="Open Sans" charset="0"/>
-              </a:rPr>
-              <a:t> </a:t>
-            </a:r>
-            <a:r>
-              <a:rPr lang="en-US" sz="2800" dirty="0" smtClean="0">
-                <a:latin typeface="Open Sans" charset="0"/>
-                <a:ea typeface="Open Sans" charset="0"/>
-                <a:cs typeface="Open Sans" charset="0"/>
-              </a:rPr>
-              <a:t>‘props’ du </a:t>
+              <a:t> ‘props’ du </a:t>
             </a:r>
             <a:r>
               <a:rPr lang="en-US" sz="2800" dirty="0" err="1" smtClean="0">
@@ -4875,15 +4851,7 @@
                 <a:ea typeface="Open Sans" charset="0"/>
                 <a:cs typeface="Open Sans" charset="0"/>
               </a:rPr>
-              <a:t>parents-to-children </a:t>
-            </a:r>
-            <a:r>
-              <a:rPr lang="en-US" sz="3600" dirty="0" smtClean="0">
-                <a:latin typeface="Open Sans" charset="0"/>
-                <a:ea typeface="Open Sans" charset="0"/>
-                <a:cs typeface="Open Sans" charset="0"/>
-              </a:rPr>
-              <a:t>– </a:t>
+              <a:t>parents-to-children – </a:t>
             </a:r>
             <a:r>
               <a:rPr lang="en-US" sz="3600" dirty="0" err="1" smtClean="0">
@@ -5897,6 +5865,13 @@
   <p:clrMapOvr>
     <a:masterClrMapping/>
   </p:clrMapOvr>
+  <p:timing>
+    <p:tnLst>
+      <p:par>
+        <p:cTn id="1" dur="indefinite" restart="never" nodeType="tmRoot"/>
+      </p:par>
+    </p:tnLst>
+  </p:timing>
 </p:sld>
 </file>
 
@@ -6255,7 +6230,7 @@
         </p:blipFill>
         <p:spPr>
           <a:xfrm>
-            <a:off x="5503303" y="2897901"/>
+            <a:off x="5843145" y="3673563"/>
             <a:ext cx="2743825" cy="901521"/>
           </a:xfrm>
           <a:prstGeom prst="rect">
@@ -6284,7 +6259,7 @@
         </p:blipFill>
         <p:spPr>
           <a:xfrm>
-            <a:off x="4863207" y="4800649"/>
+            <a:off x="4863206" y="5187015"/>
             <a:ext cx="2351851" cy="772732"/>
           </a:xfrm>
           <a:prstGeom prst="rect">
@@ -6379,6 +6354,35 @@
           </a:prstGeom>
         </p:spPr>
       </p:pic>
+      <p:pic>
+        <p:nvPicPr>
+          <p:cNvPr id="12" name="Picture 11"/>
+          <p:cNvPicPr>
+            <a:picLocks noChangeAspect="1"/>
+          </p:cNvPicPr>
+          <p:nvPr/>
+        </p:nvPicPr>
+        <p:blipFill rotWithShape="1">
+          <a:blip r:embed="rId11">
+            <a:extLst>
+              <a:ext uri="{28A0092B-C50C-407E-A947-70E740481C1C}">
+                <a14:useLocalDpi xmlns:a14="http://schemas.microsoft.com/office/drawing/2010/main" val="0"/>
+              </a:ext>
+            </a:extLst>
+          </a:blip>
+          <a:srcRect l="13002" t="36056" r="12477" b="35212"/>
+          <a:stretch/>
+        </p:blipFill>
+        <p:spPr>
+          <a:xfrm>
+            <a:off x="4102740" y="2821921"/>
+            <a:ext cx="2884868" cy="626078"/>
+          </a:xfrm>
+          <a:prstGeom prst="rect">
+            <a:avLst/>
+          </a:prstGeom>
+        </p:spPr>
+      </p:pic>
     </p:spTree>
     <p:extLst>
       <p:ext uri="{BB962C8B-B14F-4D97-AF65-F5344CB8AC3E}">
@@ -6540,11 +6544,6 @@
               </a:rPr>
               <a:t>-tech/talks-code/tree/master/10-introduction-react-js</a:t>
             </a:r>
-            <a:endParaRPr lang="en-US" sz="2400" dirty="0">
-              <a:latin typeface="Open Sans" charset="0"/>
-              <a:ea typeface="Open Sans" charset="0"/>
-              <a:cs typeface="Open Sans" charset="0"/>
-            </a:endParaRPr>
           </a:p>
         </p:txBody>
       </p:sp>
@@ -9329,15 +9328,7 @@
                 <a:ea typeface="Open Sans" charset="0"/>
                 <a:cs typeface="Open Sans" charset="0"/>
               </a:rPr>
-              <a:t>É</a:t>
-            </a:r>
-            <a:r>
-              <a:rPr lang="en-US" sz="2800" dirty="0" err="1" smtClean="0">
-                <a:latin typeface="Open Sans" charset="0"/>
-                <a:ea typeface="Open Sans" charset="0"/>
-                <a:cs typeface="Open Sans" charset="0"/>
-              </a:rPr>
-              <a:t>viter</a:t>
+              <a:t>Éviter</a:t>
             </a:r>
             <a:r>
               <a:rPr lang="en-US" sz="2800" dirty="0" smtClean="0">
@@ -9345,15 +9336,7 @@
                 <a:ea typeface="Open Sans" charset="0"/>
                 <a:cs typeface="Open Sans" charset="0"/>
               </a:rPr>
-              <a:t> </a:t>
-            </a:r>
-            <a:r>
-              <a:rPr lang="en-US" sz="2800" dirty="0" smtClean="0">
-                <a:latin typeface="Open Sans" charset="0"/>
-                <a:ea typeface="Open Sans" charset="0"/>
-                <a:cs typeface="Open Sans" charset="0"/>
-              </a:rPr>
-              <a:t>de modifier le layout </a:t>
+              <a:t> de modifier le layout </a:t>
             </a:r>
             <a:r>
               <a:rPr lang="en-US" sz="2800" dirty="0" err="1" smtClean="0">
@@ -9508,15 +9491,7 @@
                 <a:ea typeface="Open Sans" charset="0"/>
                 <a:cs typeface="Open Sans" charset="0"/>
               </a:rPr>
-              <a:t>la </a:t>
-            </a:r>
-            <a:r>
-              <a:rPr lang="en-US" dirty="0" smtClean="0">
-                <a:latin typeface="Open Sans" charset="0"/>
-                <a:ea typeface="Open Sans" charset="0"/>
-                <a:cs typeface="Open Sans" charset="0"/>
-              </a:rPr>
-              <a:t>page </a:t>
+              <a:t>la page </a:t>
             </a:r>
             <a:r>
               <a:rPr lang="en-US" dirty="0" err="1" smtClean="0">

</xml_diff>